<commit_message>
Data loading module added to toolbox. TIMIT load works.
</commit_message>
<xml_diff>
--- a/documentation/deep_learning_final_project_poster.pptx
+++ b/documentation/deep_learning_final_project_poster.pptx
@@ -104,6 +104,11 @@
       </a:defRPr>
     </a:lvl9pPr>
   </p:defaultTextStyle>
+  <p:extLst>
+    <p:ext uri="{EFAFB233-063F-42B5-8137-9DF3F51BA10A}">
+      <p15:sldGuideLst xmlns:p15="http://schemas.microsoft.com/office/powerpoint/2012/main"/>
+    </p:ext>
+  </p:extLst>
 </p:presentation>
 </file>
 
@@ -3012,6 +3017,348 @@
           </a:p>
         </p:txBody>
       </p:sp>
+      <p:sp>
+        <p:nvSpPr>
+          <p:cNvPr id="4" name="TextBox 3">
+            <a:extLst>
+              <a:ext uri="{FF2B5EF4-FFF2-40B4-BE49-F238E27FC236}">
+                <a16:creationId xmlns:a16="http://schemas.microsoft.com/office/drawing/2014/main" id="{A129F3C0-6B90-4959-93BE-34D169BC76D5}"/>
+              </a:ext>
+            </a:extLst>
+          </p:cNvPr>
+          <p:cNvSpPr txBox="1"/>
+          <p:nvPr/>
+        </p:nvSpPr>
+        <p:spPr>
+          <a:xfrm>
+            <a:off x="2672953" y="5633294"/>
+            <a:ext cx="10255647" cy="5909310"/>
+          </a:xfrm>
+          <a:prstGeom prst="rect">
+            <a:avLst/>
+          </a:prstGeom>
+          <a:noFill/>
+        </p:spPr>
+        <p:txBody>
+          <a:bodyPr wrap="square">
+            <a:spAutoFit/>
+          </a:bodyPr>
+          <a:lstStyle/>
+          <a:p>
+            <a:pPr algn="l"/>
+            <a:r>
+              <a:rPr lang="en-US" sz="1800" b="0" i="0" u="none" strike="noStrike" baseline="0" dirty="0">
+                <a:solidFill>
+                  <a:srgbClr val="000000"/>
+                </a:solidFill>
+                <a:latin typeface="ArialMT"/>
+              </a:rPr>
+              <a:t>Motivation: Many people </a:t>
+            </a:r>
+            <a:r>
+              <a:rPr lang="en-US" sz="1800" b="0" i="0" u="none" strike="noStrike" baseline="0" dirty="0">
+                <a:solidFill>
+                  <a:srgbClr val="222222"/>
+                </a:solidFill>
+                <a:latin typeface="ArialMT"/>
+              </a:rPr>
+              <a:t>struggle to understand speech in challenging acoustics, e.g. inside</a:t>
+            </a:r>
+          </a:p>
+          <a:p>
+            <a:pPr algn="l"/>
+            <a:r>
+              <a:rPr lang="en-US" sz="1800" b="0" i="0" u="none" strike="noStrike" baseline="0" dirty="0">
+                <a:solidFill>
+                  <a:srgbClr val="222222"/>
+                </a:solidFill>
+                <a:latin typeface="ArialMT"/>
+              </a:rPr>
+              <a:t>a noisy bar. Therefore, enhancing the intelligibility of noisy speech signals is one of the key</a:t>
+            </a:r>
+          </a:p>
+          <a:p>
+            <a:pPr algn="l"/>
+            <a:r>
+              <a:rPr lang="en-US" sz="1800" b="0" i="0" u="none" strike="noStrike" baseline="0" dirty="0">
+                <a:solidFill>
+                  <a:srgbClr val="222222"/>
+                </a:solidFill>
+                <a:latin typeface="ArialMT"/>
+              </a:rPr>
+              <a:t>challenges for any producer of modern communication devices.</a:t>
+            </a:r>
+          </a:p>
+          <a:p>
+            <a:pPr algn="l"/>
+            <a:endParaRPr lang="en-US" sz="1800" b="0" i="0" u="none" strike="noStrike" baseline="0" dirty="0">
+              <a:solidFill>
+                <a:srgbClr val="222222"/>
+              </a:solidFill>
+              <a:latin typeface="ArialMT"/>
+            </a:endParaRPr>
+          </a:p>
+          <a:p>
+            <a:pPr algn="l"/>
+            <a:r>
+              <a:rPr lang="en-US" sz="1800" b="0" i="0" u="none" strike="noStrike" baseline="0" dirty="0">
+                <a:solidFill>
+                  <a:srgbClr val="222222"/>
+                </a:solidFill>
+                <a:latin typeface="ArialMT"/>
+              </a:rPr>
+              <a:t>The problem is often tackled by dividing a noisy speech signal into a number of frequency</a:t>
+            </a:r>
+          </a:p>
+          <a:p>
+            <a:pPr algn="l"/>
+            <a:r>
+              <a:rPr lang="en-US" sz="1800" b="0" i="0" u="none" strike="noStrike" baseline="0" dirty="0">
+                <a:solidFill>
+                  <a:srgbClr val="222222"/>
+                </a:solidFill>
+                <a:latin typeface="ArialMT"/>
+              </a:rPr>
+              <a:t>bands and attenuating the ones where the signal-to-noise ratio is insufficient. This approach,</a:t>
+            </a:r>
+          </a:p>
+          <a:p>
+            <a:pPr algn="l"/>
+            <a:r>
+              <a:rPr lang="en-US" sz="1800" b="0" i="0" u="none" strike="noStrike" baseline="0" dirty="0">
+                <a:solidFill>
+                  <a:srgbClr val="222222"/>
+                </a:solidFill>
+                <a:latin typeface="ArialMT"/>
+              </a:rPr>
+              <a:t>while effective in some situations, often leads to poor results, and sometimes even</a:t>
+            </a:r>
+          </a:p>
+          <a:p>
+            <a:pPr algn="l"/>
+            <a:r>
+              <a:rPr lang="en-US" sz="1800" b="0" i="0" u="none" strike="noStrike" baseline="0" dirty="0">
+                <a:solidFill>
+                  <a:srgbClr val="222222"/>
+                </a:solidFill>
+                <a:latin typeface="ArialMT"/>
+              </a:rPr>
+              <a:t>exacerbates the problem it is trying to solve.</a:t>
+            </a:r>
+          </a:p>
+          <a:p>
+            <a:pPr algn="l"/>
+            <a:endParaRPr lang="en-US" sz="1800" b="0" i="0" u="none" strike="noStrike" baseline="0" dirty="0">
+              <a:solidFill>
+                <a:srgbClr val="222222"/>
+              </a:solidFill>
+              <a:latin typeface="ArialMT"/>
+            </a:endParaRPr>
+          </a:p>
+          <a:p>
+            <a:pPr algn="l"/>
+            <a:r>
+              <a:rPr lang="en-US" sz="1800" b="0" i="0" u="none" strike="noStrike" baseline="0" dirty="0">
+                <a:solidFill>
+                  <a:srgbClr val="222222"/>
+                </a:solidFill>
+                <a:latin typeface="ArialMT"/>
+              </a:rPr>
+              <a:t>The hearing aids, aside from attempting to remove the noise, also amplify the frequency</a:t>
+            </a:r>
+          </a:p>
+          <a:p>
+            <a:pPr algn="l"/>
+            <a:r>
+              <a:rPr lang="en-US" sz="1800" b="0" i="0" u="none" strike="noStrike" baseline="0" dirty="0">
+                <a:solidFill>
+                  <a:srgbClr val="222222"/>
+                </a:solidFill>
+                <a:latin typeface="ArialMT"/>
+              </a:rPr>
+              <a:t>bands in which the wearer has a hearing loss. The gain applied at these frequencies</a:t>
+            </a:r>
+          </a:p>
+          <a:p>
+            <a:pPr algn="l"/>
+            <a:r>
+              <a:rPr lang="en-US" sz="1800" b="0" i="0" u="none" strike="noStrike" baseline="0" dirty="0">
+                <a:solidFill>
+                  <a:srgbClr val="222222"/>
+                </a:solidFill>
+                <a:latin typeface="ArialMT"/>
+              </a:rPr>
+              <a:t>depends on the user’s audiogram, which means that broadly speaking, all users with the</a:t>
+            </a:r>
+          </a:p>
+          <a:p>
+            <a:pPr algn="l"/>
+            <a:r>
+              <a:rPr lang="en-US" sz="1800" b="0" i="0" u="none" strike="noStrike" baseline="0" dirty="0">
+                <a:solidFill>
+                  <a:srgbClr val="222222"/>
+                </a:solidFill>
+                <a:latin typeface="ArialMT"/>
+              </a:rPr>
+              <a:t>same audiogram are given the same gain setting. However, the sound perception among the</a:t>
+            </a:r>
+          </a:p>
+          <a:p>
+            <a:pPr algn="l"/>
+            <a:r>
+              <a:rPr lang="en-US" sz="1800" b="0" i="0" u="none" strike="noStrike" baseline="0" dirty="0">
+                <a:solidFill>
+                  <a:srgbClr val="222222"/>
+                </a:solidFill>
+                <a:latin typeface="ArialMT"/>
+              </a:rPr>
+              <a:t>individuals sharing the same audiogram can vary greatly, and thus finding a better way of</a:t>
+            </a:r>
+          </a:p>
+          <a:p>
+            <a:pPr algn="l"/>
+            <a:r>
+              <a:rPr lang="en-US" sz="1800" b="0" i="0" u="none" strike="noStrike" baseline="0" dirty="0">
+                <a:solidFill>
+                  <a:srgbClr val="222222"/>
+                </a:solidFill>
+                <a:latin typeface="ArialMT"/>
+              </a:rPr>
+              <a:t>adapting the frequency-gain curve to the individual needs has the potential for increasing the</a:t>
+            </a:r>
+          </a:p>
+          <a:p>
+            <a:pPr algn="l"/>
+            <a:r>
+              <a:rPr lang="en-US" sz="1800" b="0" i="0" u="none" strike="noStrike" baseline="0" dirty="0">
+                <a:solidFill>
+                  <a:srgbClr val="222222"/>
+                </a:solidFill>
+                <a:latin typeface="ArialMT"/>
+              </a:rPr>
+              <a:t>improvement of speech intelligibility by the device.</a:t>
+            </a:r>
+          </a:p>
+          <a:p>
+            <a:pPr algn="l"/>
+            <a:endParaRPr lang="en-US" sz="1800" b="0" i="0" u="none" strike="noStrike" baseline="0" dirty="0">
+              <a:solidFill>
+                <a:srgbClr val="222222"/>
+              </a:solidFill>
+              <a:latin typeface="ArialMT"/>
+            </a:endParaRPr>
+          </a:p>
+          <a:p>
+            <a:pPr algn="l"/>
+            <a:r>
+              <a:rPr lang="en-US" sz="1800" b="0" i="0" u="none" strike="noStrike" baseline="0" dirty="0">
+                <a:solidFill>
+                  <a:srgbClr val="222222"/>
+                </a:solidFill>
+                <a:latin typeface="ArialMT"/>
+              </a:rPr>
+              <a:t>In this project, we will aim to train a model for obtaining the frequency-gain curve that will</a:t>
+            </a:r>
+          </a:p>
+          <a:p>
+            <a:pPr algn="l"/>
+            <a:r>
+              <a:rPr lang="en-US" sz="1800" b="0" i="0" u="none" strike="noStrike" baseline="0" dirty="0">
+                <a:solidFill>
+                  <a:srgbClr val="222222"/>
+                </a:solidFill>
+                <a:latin typeface="ArialMT"/>
+              </a:rPr>
+              <a:t>result in the highest speech intelligibility. The model is implemented using the </a:t>
+            </a:r>
+            <a:r>
+              <a:rPr lang="en-US" sz="1800" b="0" i="0" u="none" strike="noStrike" baseline="0" dirty="0" err="1">
+                <a:solidFill>
+                  <a:srgbClr val="1155CD"/>
+                </a:solidFill>
+                <a:latin typeface="ArialMT"/>
+              </a:rPr>
+              <a:t>PyTorch</a:t>
+            </a:r>
+            <a:endParaRPr lang="en-US" sz="1800" b="0" i="0" u="none" strike="noStrike" baseline="0" dirty="0">
+              <a:solidFill>
+                <a:srgbClr val="1155CD"/>
+              </a:solidFill>
+              <a:latin typeface="ArialMT"/>
+            </a:endParaRPr>
+          </a:p>
+          <a:p>
+            <a:pPr algn="l"/>
+            <a:r>
+              <a:rPr lang="en-US" sz="1800" b="0" i="0" u="none" strike="noStrike" baseline="0" dirty="0">
+                <a:solidFill>
+                  <a:srgbClr val="1155CD"/>
+                </a:solidFill>
+                <a:latin typeface="ArialMT"/>
+              </a:rPr>
+              <a:t>differentiation package </a:t>
+            </a:r>
+            <a:r>
+              <a:rPr lang="en-US" sz="1800" b="0" i="0" u="none" strike="noStrike" baseline="0" dirty="0">
+                <a:solidFill>
+                  <a:srgbClr val="222222"/>
+                </a:solidFill>
+                <a:latin typeface="ArialMT"/>
+              </a:rPr>
+              <a:t>and evaluated on the </a:t>
+            </a:r>
+            <a:r>
+              <a:rPr lang="en-US" sz="1800" b="0" i="0" u="none" strike="noStrike" baseline="0" dirty="0">
+                <a:solidFill>
+                  <a:srgbClr val="1155CD"/>
+                </a:solidFill>
+                <a:latin typeface="ArialMT"/>
+              </a:rPr>
+              <a:t>TIMIT speech dataset</a:t>
+            </a:r>
+            <a:r>
+              <a:rPr lang="en-US" sz="1800" b="0" i="0" u="none" strike="noStrike" baseline="0" dirty="0">
+                <a:solidFill>
+                  <a:srgbClr val="222222"/>
+                </a:solidFill>
+                <a:latin typeface="ArialMT"/>
+              </a:rPr>
+              <a:t>. We will use an objective</a:t>
+            </a:r>
+          </a:p>
+          <a:p>
+            <a:pPr algn="l"/>
+            <a:r>
+              <a:rPr lang="en-US" sz="1800" b="0" i="0" u="none" strike="noStrike" baseline="0" dirty="0">
+                <a:solidFill>
+                  <a:srgbClr val="222222"/>
+                </a:solidFill>
+                <a:latin typeface="ArialMT"/>
+              </a:rPr>
+              <a:t>function correlated with </a:t>
+            </a:r>
+            <a:r>
+              <a:rPr lang="en-US" sz="1800" b="0" i="0" u="none" strike="noStrike" baseline="0" dirty="0">
+                <a:solidFill>
+                  <a:srgbClr val="1155CD"/>
+                </a:solidFill>
+                <a:latin typeface="ArialMT"/>
+              </a:rPr>
+              <a:t>HASPI speech intelligibility auditory processing mode</a:t>
+            </a:r>
+            <a:r>
+              <a:rPr lang="en-US" sz="1800" b="0" i="0" u="none" strike="noStrike" baseline="0" dirty="0">
+                <a:solidFill>
+                  <a:srgbClr val="222222"/>
+                </a:solidFill>
+                <a:latin typeface="ArialMT"/>
+              </a:rPr>
+              <a:t>.</a:t>
+            </a:r>
+            <a:endParaRPr lang="en-US" dirty="0"/>
+          </a:p>
+        </p:txBody>
+      </p:sp>
     </p:spTree>
     <p:extLst>
       <p:ext uri="{BB962C8B-B14F-4D97-AF65-F5344CB8AC3E}">

</xml_diff>